<commit_message>
add ad copy in footer
</commit_message>
<xml_diff>
--- a/doc/Location TVM.pptx
+++ b/doc/Location TVM.pptx
@@ -253,7 +253,7 @@
             <a:pPr rtl="0"/>
             <a:fld id="{996F3730-8562-4D7F-A2D1-B258C4FC42CB}" type="datetime1">
               <a:rPr lang="fr-FR" smtClean="0"/>
-              <a:t>05/09/2024</a:t>
+              <a:t>16/09/2024</a:t>
             </a:fld>
             <a:endParaRPr lang="fr-FR"/>
           </a:p>
@@ -435,7 +435,7 @@
             <a:fld id="{0F28B237-C4D2-43EE-AC18-AA163EB3D7BC}" type="datetime1">
               <a:rPr lang="fr-FR" smtClean="0"/>
               <a:pPr/>
-              <a:t>05/09/2024</a:t>
+              <a:t>16/09/2024</a:t>
             </a:fld>
             <a:endParaRPr lang="fr-FR" dirty="0"/>
           </a:p>
@@ -18369,7 +18369,7 @@
             <a:pPr algn="ctr" rtl="0"/>
             <a:r>
               <a:rPr lang="en-US" sz="2800" noProof="1"/>
-              <a:t>The latest software engineering project in our group 19 called "LOCATION TVM" is a website that allows users to save money and time, and we are carefully served to ensure the convenience we offer for the perfect transfer solution tailored to your needs.</a:t>
+              <a:t>The latest software engineering project in our cohort 19 called "LOCATION TVM" is a website that allows users to save money and time, and we are carefully served to ensure the convenience we offer for the perfect transfer solution tailored to your needs.</a:t>
             </a:r>
             <a:endParaRPr lang="fr-FR" sz="2800" noProof="1"/>
           </a:p>
@@ -20448,15 +20448,6 @@
 </file>
 
 <file path=customXml/item1.xml><?xml version="1.0" encoding="utf-8"?>
-<?mso-contentType ?>
-<FormTemplates xmlns="http://schemas.microsoft.com/sharepoint/v3/contenttype/forms">
-  <Display>DocumentLibraryForm</Display>
-  <Edit>DocumentLibraryForm</Edit>
-  <New>DocumentLibraryForm</New>
-</FormTemplates>
-</file>
-
-<file path=customXml/item2.xml><?xml version="1.0" encoding="utf-8"?>
 <ct:contentTypeSchema xmlns:ct="http://schemas.microsoft.com/office/2006/metadata/contentType" xmlns:ma="http://schemas.microsoft.com/office/2006/metadata/properties/metaAttributes" ct:_="" ma:_="" ma:contentTypeName="Document" ma:contentTypeID="0x01010079F111ED35F8CC479449609E8A0923A6" ma:contentTypeVersion="20" ma:contentTypeDescription="Create a new document." ma:contentTypeScope="" ma:versionID="1267097ee5f5874adfcc408041ae252e">
   <xsd:schema xmlns:xsd="http://www.w3.org/2001/XMLSchema" xmlns:xs="http://www.w3.org/2001/XMLSchema" xmlns:p="http://schemas.microsoft.com/office/2006/metadata/properties" xmlns:ns1="http://schemas.microsoft.com/sharepoint/v3" xmlns:ns2="71af3243-3dd4-4a8d-8c0d-dd76da1f02a5" xmlns:ns3="16c05727-aa75-4e4a-9b5f-8a80a1165891" xmlns:ns4="230e9df3-be65-4c73-a93b-d1236ebd677e" targetNamespace="http://schemas.microsoft.com/office/2006/metadata/properties" ma:root="true" ma:fieldsID="395891a93df65b14727750f2c06c306c" ns1:_="" ns2:_="" ns3:_="" ns4:_="">
     <xsd:import namespace="http://schemas.microsoft.com/sharepoint/v3"/>
@@ -20732,6 +20723,15 @@
 </ct:contentTypeSchema>
 </file>
 
+<file path=customXml/item2.xml><?xml version="1.0" encoding="utf-8"?>
+<?mso-contentType ?>
+<FormTemplates xmlns="http://schemas.microsoft.com/sharepoint/v3/contenttype/forms">
+  <Display>DocumentLibraryForm</Display>
+  <Edit>DocumentLibraryForm</Edit>
+  <New>DocumentLibraryForm</New>
+</FormTemplates>
+</file>
+
 <file path=customXml/item3.xml><?xml version="1.0" encoding="utf-8"?>
 <p:properties xmlns:p="http://schemas.microsoft.com/office/2006/metadata/properties" xmlns:xsi="http://www.w3.org/2001/XMLSchema-instance" xmlns:pc="http://schemas.microsoft.com/office/infopath/2007/PartnerControls">
   <documentManagement>
@@ -20752,14 +20752,6 @@
 </file>
 
 <file path=customXml/itemProps1.xml><?xml version="1.0" encoding="utf-8"?>
-<ds:datastoreItem xmlns:ds="http://schemas.openxmlformats.org/officeDocument/2006/customXml" ds:itemID="{42BC90D6-94CF-42F7-AAC4-9CF6824C54D5}">
-  <ds:schemaRefs>
-    <ds:schemaRef ds:uri="http://schemas.microsoft.com/sharepoint/v3/contenttype/forms"/>
-  </ds:schemaRefs>
-</ds:datastoreItem>
-</file>
-
-<file path=customXml/itemProps2.xml><?xml version="1.0" encoding="utf-8"?>
 <ds:datastoreItem xmlns:ds="http://schemas.openxmlformats.org/officeDocument/2006/customXml" ds:itemID="{64CF2EF3-001F-4BE9-81B3-86ECBBF9425F}">
   <ds:schemaRefs>
     <ds:schemaRef ds:uri="http://schemas.microsoft.com/office/2006/metadata/contentType"/>
@@ -20776,6 +20768,14 @@
     <ds:schemaRef ds:uri="http://purl.org/dc/elements/1.1/"/>
     <ds:schemaRef ds:uri="http://purl.org/dc/terms/"/>
     <ds:schemaRef ds:uri="http://schemas.microsoft.com/internal/obd"/>
+  </ds:schemaRefs>
+</ds:datastoreItem>
+</file>
+
+<file path=customXml/itemProps2.xml><?xml version="1.0" encoding="utf-8"?>
+<ds:datastoreItem xmlns:ds="http://schemas.openxmlformats.org/officeDocument/2006/customXml" ds:itemID="{42BC90D6-94CF-42F7-AAC4-9CF6824C54D5}">
+  <ds:schemaRefs>
+    <ds:schemaRef ds:uri="http://schemas.microsoft.com/sharepoint/v3/contenttype/forms"/>
   </ds:schemaRefs>
 </ds:datastoreItem>
 </file>

</xml_diff>